<commit_message>
no productization, flat figure
</commit_message>
<xml_diff>
--- a/FAST 2018 submission/figs/OmidEvolution.pptx
+++ b/FAST 2018 submission/figs/OmidEvolution.pptx
@@ -6,6 +6,7 @@
   </p:sldMasterIdLst>
   <p:sldIdLst>
     <p:sldId id="256" r:id="rId2"/>
+    <p:sldId id="257" r:id="rId3"/>
   </p:sldIdLst>
   <p:sldSz cx="9144000" cy="6858000" type="screen4x3"/>
   <p:notesSz cx="6858000" cy="9144000"/>
@@ -3153,6 +3154,10 @@
               <a:rPr lang="en-US" sz="3200" b="1" dirty="0" err="1" smtClean="0"/>
               <a:t>Omid</a:t>
             </a:r>
+            <a:r>
+              <a:rPr lang="en-US" sz="3200" b="1" dirty="0" smtClean="0"/>
+              <a:t> </a:t>
+            </a:r>
             <a:endParaRPr lang="en-US" sz="3200" b="1" dirty="0"/>
           </a:p>
         </p:txBody>
@@ -3522,25 +3527,306 @@
           </a:p>
         </p:txBody>
       </p:sp>
-      <p:sp>
-        <p:nvSpPr>
-          <p:cNvPr id="32" name="Rounded Rectangular Callout 31"/>
+    </p:spTree>
+    <p:extLst>
+      <p:ext uri="{BB962C8B-B14F-4D97-AF65-F5344CB8AC3E}">
+        <p14:creationId xmlns:p14="http://schemas.microsoft.com/office/powerpoint/2010/main" val="723141169"/>
+      </p:ext>
+    </p:extLst>
+  </p:cSld>
+  <p:clrMapOvr>
+    <a:masterClrMapping/>
+  </p:clrMapOvr>
+</p:sld>
+</file>
+
+<file path=ppt/slides/slide2.xml><?xml version="1.0" encoding="utf-8"?>
+<p:sld xmlns:a="http://schemas.openxmlformats.org/drawingml/2006/main" xmlns:r="http://schemas.openxmlformats.org/officeDocument/2006/relationships" xmlns:p="http://schemas.openxmlformats.org/presentationml/2006/main">
+  <p:cSld>
+    <p:spTree>
+      <p:nvGrpSpPr>
+        <p:cNvPr id="1" name=""/>
+        <p:cNvGrpSpPr/>
+        <p:nvPr/>
+      </p:nvGrpSpPr>
+      <p:grpSpPr>
+        <a:xfrm>
+          <a:off x="0" y="0"/>
+          <a:ext cx="0" cy="0"/>
+          <a:chOff x="0" y="0"/>
+          <a:chExt cx="0" cy="0"/>
+        </a:xfrm>
+      </p:grpSpPr>
+      <p:sp>
+        <p:nvSpPr>
+          <p:cNvPr id="2" name="TextBox 1"/>
+          <p:cNvSpPr txBox="1"/>
+          <p:nvPr/>
+        </p:nvSpPr>
+        <p:spPr>
+          <a:xfrm>
+            <a:off x="771950" y="1953736"/>
+            <a:ext cx="1325002" cy="584776"/>
+          </a:xfrm>
+          <a:prstGeom prst="rect">
+            <a:avLst/>
+          </a:prstGeom>
+          <a:noFill/>
+        </p:spPr>
+        <p:txBody>
+          <a:bodyPr wrap="none" rtlCol="0">
+            <a:spAutoFit/>
+          </a:bodyPr>
+          <a:lstStyle/>
+          <a:p>
+            <a:pPr algn="ctr"/>
+            <a:r>
+              <a:rPr lang="en-US" sz="3200" b="1" dirty="0" smtClean="0"/>
+              <a:t>Omid1</a:t>
+            </a:r>
+            <a:endParaRPr lang="en-US" sz="3200" b="1" dirty="0"/>
+          </a:p>
+        </p:txBody>
+      </p:sp>
+      <p:sp>
+        <p:nvSpPr>
+          <p:cNvPr id="3" name="TextBox 2"/>
+          <p:cNvSpPr txBox="1"/>
+          <p:nvPr/>
+        </p:nvSpPr>
+        <p:spPr>
+          <a:xfrm>
+            <a:off x="2704452" y="1953736"/>
+            <a:ext cx="1117013" cy="584776"/>
+          </a:xfrm>
+          <a:prstGeom prst="rect">
+            <a:avLst/>
+          </a:prstGeom>
+          <a:noFill/>
+        </p:spPr>
+        <p:txBody>
+          <a:bodyPr wrap="none" rtlCol="0">
+            <a:spAutoFit/>
+          </a:bodyPr>
+          <a:lstStyle/>
+          <a:p>
+            <a:pPr algn="ctr"/>
+            <a:r>
+              <a:rPr lang="en-US" sz="3200" b="1" dirty="0" err="1" smtClean="0"/>
+              <a:t>Omid</a:t>
+            </a:r>
+            <a:r>
+              <a:rPr lang="en-US" sz="3200" b="1" dirty="0" smtClean="0"/>
+              <a:t> </a:t>
+            </a:r>
+            <a:endParaRPr lang="en-US" sz="3200" b="1" dirty="0"/>
+          </a:p>
+        </p:txBody>
+      </p:sp>
+      <p:cxnSp>
+        <p:nvCxnSpPr>
+          <p:cNvPr id="4" name="Straight Connector 3"/>
+          <p:cNvCxnSpPr>
+            <a:stCxn id="2" idx="3"/>
+            <a:endCxn id="3" idx="1"/>
+          </p:cNvCxnSpPr>
+          <p:nvPr/>
+        </p:nvCxnSpPr>
+        <p:spPr>
+          <a:xfrm>
+            <a:off x="2096952" y="2246124"/>
+            <a:ext cx="607500" cy="0"/>
+          </a:xfrm>
+          <a:prstGeom prst="line">
+            <a:avLst/>
+          </a:prstGeom>
+          <a:ln>
+            <a:solidFill>
+              <a:schemeClr val="tx1"/>
+            </a:solidFill>
+            <a:tailEnd type="stealth" w="lg" len="lg"/>
+          </a:ln>
+        </p:spPr>
+        <p:style>
+          <a:lnRef idx="2">
+            <a:schemeClr val="accent1"/>
+          </a:lnRef>
+          <a:fillRef idx="0">
+            <a:schemeClr val="accent1"/>
+          </a:fillRef>
+          <a:effectRef idx="1">
+            <a:schemeClr val="accent1"/>
+          </a:effectRef>
+          <a:fontRef idx="minor">
+            <a:schemeClr val="tx1"/>
+          </a:fontRef>
+        </p:style>
+      </p:cxnSp>
+      <p:sp>
+        <p:nvSpPr>
+          <p:cNvPr id="5" name="TextBox 4"/>
+          <p:cNvSpPr txBox="1"/>
+          <p:nvPr/>
+        </p:nvSpPr>
+        <p:spPr>
+          <a:xfrm>
+            <a:off x="4527719" y="1953736"/>
+            <a:ext cx="1556836" cy="584776"/>
+          </a:xfrm>
+          <a:prstGeom prst="rect">
+            <a:avLst/>
+          </a:prstGeom>
+          <a:noFill/>
+        </p:spPr>
+        <p:txBody>
+          <a:bodyPr wrap="none" rtlCol="0">
+            <a:spAutoFit/>
+          </a:bodyPr>
+          <a:lstStyle/>
+          <a:p>
+            <a:pPr algn="ctr"/>
+            <a:r>
+              <a:rPr lang="en-US" sz="3200" b="1" dirty="0" err="1" smtClean="0"/>
+              <a:t>Omid</a:t>
+            </a:r>
+            <a:r>
+              <a:rPr lang="en-US" sz="3200" b="1" dirty="0" smtClean="0"/>
+              <a:t> LL</a:t>
+            </a:r>
+            <a:endParaRPr lang="en-US" sz="3200" b="1" dirty="0"/>
+          </a:p>
+        </p:txBody>
+      </p:sp>
+      <p:cxnSp>
+        <p:nvCxnSpPr>
+          <p:cNvPr id="6" name="Straight Connector 5"/>
+          <p:cNvCxnSpPr>
+            <a:stCxn id="3" idx="3"/>
+            <a:endCxn id="5" idx="1"/>
+          </p:cNvCxnSpPr>
+          <p:nvPr/>
+        </p:nvCxnSpPr>
+        <p:spPr>
+          <a:xfrm>
+            <a:off x="3821465" y="2246124"/>
+            <a:ext cx="706254" cy="0"/>
+          </a:xfrm>
+          <a:prstGeom prst="line">
+            <a:avLst/>
+          </a:prstGeom>
+          <a:ln>
+            <a:solidFill>
+              <a:schemeClr val="tx1"/>
+            </a:solidFill>
+            <a:tailEnd type="stealth" w="lg" len="lg"/>
+          </a:ln>
+        </p:spPr>
+        <p:style>
+          <a:lnRef idx="2">
+            <a:schemeClr val="accent1"/>
+          </a:lnRef>
+          <a:fillRef idx="0">
+            <a:schemeClr val="accent1"/>
+          </a:fillRef>
+          <a:effectRef idx="1">
+            <a:schemeClr val="accent1"/>
+          </a:effectRef>
+          <a:fontRef idx="minor">
+            <a:schemeClr val="tx1"/>
+          </a:fontRef>
+        </p:style>
+      </p:cxnSp>
+      <p:sp>
+        <p:nvSpPr>
+          <p:cNvPr id="7" name="TextBox 6"/>
+          <p:cNvSpPr txBox="1"/>
+          <p:nvPr/>
+        </p:nvSpPr>
+        <p:spPr>
+          <a:xfrm>
+            <a:off x="6658423" y="1953736"/>
+            <a:ext cx="1440018" cy="584776"/>
+          </a:xfrm>
+          <a:prstGeom prst="rect">
+            <a:avLst/>
+          </a:prstGeom>
+          <a:noFill/>
+        </p:spPr>
+        <p:txBody>
+          <a:bodyPr wrap="none" rtlCol="0">
+            <a:spAutoFit/>
+          </a:bodyPr>
+          <a:lstStyle/>
+          <a:p>
+            <a:pPr algn="ctr"/>
+            <a:r>
+              <a:rPr lang="en-US" sz="3200" b="1" dirty="0" err="1" smtClean="0"/>
+              <a:t>Fragola</a:t>
+            </a:r>
+            <a:endParaRPr lang="en-US" sz="3200" b="1" dirty="0"/>
+          </a:p>
+        </p:txBody>
+      </p:sp>
+      <p:cxnSp>
+        <p:nvCxnSpPr>
+          <p:cNvPr id="8" name="Straight Connector 7"/>
+          <p:cNvCxnSpPr>
+            <a:stCxn id="5" idx="3"/>
+            <a:endCxn id="7" idx="1"/>
+          </p:cNvCxnSpPr>
+          <p:nvPr/>
+        </p:nvCxnSpPr>
+        <p:spPr>
+          <a:xfrm>
+            <a:off x="6084555" y="2246124"/>
+            <a:ext cx="573868" cy="0"/>
+          </a:xfrm>
+          <a:prstGeom prst="line">
+            <a:avLst/>
+          </a:prstGeom>
+          <a:ln>
+            <a:solidFill>
+              <a:schemeClr val="tx1"/>
+            </a:solidFill>
+            <a:tailEnd type="stealth" w="lg" len="lg"/>
+          </a:ln>
+        </p:spPr>
+        <p:style>
+          <a:lnRef idx="2">
+            <a:schemeClr val="accent1"/>
+          </a:lnRef>
+          <a:fillRef idx="0">
+            <a:schemeClr val="accent1"/>
+          </a:fillRef>
+          <a:effectRef idx="1">
+            <a:schemeClr val="accent1"/>
+          </a:effectRef>
+          <a:fontRef idx="minor">
+            <a:schemeClr val="tx1"/>
+          </a:fontRef>
+        </p:style>
+      </p:cxnSp>
+      <p:sp>
+        <p:nvSpPr>
+          <p:cNvPr id="35" name="Oval 34"/>
           <p:cNvSpPr/>
           <p:nvPr/>
         </p:nvSpPr>
         <p:spPr>
           <a:xfrm>
-            <a:off x="5698787" y="1014015"/>
-            <a:ext cx="2068450" cy="995587"/>
-          </a:xfrm>
-          <a:prstGeom prst="wedgeRoundRectCallout">
-            <a:avLst>
-              <a:gd name="adj1" fmla="val -103484"/>
-              <a:gd name="adj2" fmla="val 71202"/>
-              <a:gd name="adj3" fmla="val 16667"/>
-            </a:avLst>
+            <a:off x="4027714" y="1313869"/>
+            <a:ext cx="4016298" cy="2205846"/>
+          </a:xfrm>
+          <a:prstGeom prst="ellipse">
+            <a:avLst/>
           </a:prstGeom>
           <a:noFill/>
+          <a:ln>
+            <a:solidFill>
+              <a:srgbClr val="000090"/>
+            </a:solidFill>
+            <a:prstDash val="dot"/>
+          </a:ln>
         </p:spPr>
         <p:style>
           <a:lnRef idx="1">
@@ -3561,13 +3847,39 @@
           <a:lstStyle/>
           <a:p>
             <a:pPr algn="ctr"/>
-            <a:r>
-              <a:rPr lang="en-US" sz="2800" dirty="0">
+            <a:endParaRPr lang="en-US"/>
+          </a:p>
+        </p:txBody>
+      </p:sp>
+      <p:sp>
+        <p:nvSpPr>
+          <p:cNvPr id="36" name="TextBox 35"/>
+          <p:cNvSpPr txBox="1"/>
+          <p:nvPr/>
+        </p:nvSpPr>
+        <p:spPr>
+          <a:xfrm>
+            <a:off x="5231822" y="1368297"/>
+            <a:ext cx="1705465" cy="523220"/>
+          </a:xfrm>
+          <a:prstGeom prst="rect">
+            <a:avLst/>
+          </a:prstGeom>
+          <a:noFill/>
+        </p:spPr>
+        <p:txBody>
+          <a:bodyPr wrap="none" rtlCol="0">
+            <a:spAutoFit/>
+          </a:bodyPr>
+          <a:lstStyle/>
+          <a:p>
+            <a:r>
+              <a:rPr lang="en-US" sz="2800" dirty="0" smtClean="0">
                 <a:solidFill>
                   <a:schemeClr val="tx2"/>
                 </a:solidFill>
               </a:rPr>
-              <a:t>Apache Incubator</a:t>
+              <a:t>This paper</a:t>
             </a:r>
             <a:endParaRPr lang="en-US" sz="2800" dirty="0">
               <a:solidFill>
@@ -3577,65 +3889,83 @@
           </a:p>
         </p:txBody>
       </p:sp>
-      <p:sp>
-        <p:nvSpPr>
-          <p:cNvPr id="33" name="Rounded Rectangular Callout 32"/>
-          <p:cNvSpPr/>
+      <p:cxnSp>
+        <p:nvCxnSpPr>
+          <p:cNvPr id="37" name="Straight Connector 36"/>
+          <p:cNvCxnSpPr>
+            <a:endCxn id="38" idx="1"/>
+          </p:cNvCxnSpPr>
           <p:nvPr/>
-        </p:nvSpPr>
+        </p:nvCxnSpPr>
         <p:spPr>
           <a:xfrm>
-            <a:off x="6078022" y="2554521"/>
-            <a:ext cx="2757713" cy="995587"/>
-          </a:xfrm>
-          <a:prstGeom prst="wedgeRoundRectCallout">
-            <a:avLst>
-              <a:gd name="adj1" fmla="val -93616"/>
-              <a:gd name="adj2" fmla="val 25644"/>
-              <a:gd name="adj3" fmla="val 16667"/>
-            </a:avLst>
+            <a:off x="3821465" y="2508701"/>
+            <a:ext cx="694350" cy="456631"/>
+          </a:xfrm>
+          <a:prstGeom prst="line">
+            <a:avLst/>
           </a:prstGeom>
-          <a:noFill/>
+          <a:ln>
+            <a:solidFill>
+              <a:schemeClr val="tx1"/>
+            </a:solidFill>
+            <a:tailEnd type="stealth" w="lg" len="lg"/>
+          </a:ln>
         </p:spPr>
         <p:style>
-          <a:lnRef idx="1">
+          <a:lnRef idx="2">
             <a:schemeClr val="accent1"/>
           </a:lnRef>
-          <a:fillRef idx="3">
+          <a:fillRef idx="0">
             <a:schemeClr val="accent1"/>
           </a:fillRef>
-          <a:effectRef idx="2">
+          <a:effectRef idx="1">
             <a:schemeClr val="accent1"/>
           </a:effectRef>
           <a:fontRef idx="minor">
-            <a:schemeClr val="lt1"/>
+            <a:schemeClr val="tx1"/>
           </a:fontRef>
         </p:style>
-        <p:txBody>
-          <a:bodyPr rtlCol="0" anchor="ctr"/>
+      </p:cxnSp>
+      <p:sp>
+        <p:nvSpPr>
+          <p:cNvPr id="38" name="TextBox 37"/>
+          <p:cNvSpPr txBox="1"/>
+          <p:nvPr/>
+        </p:nvSpPr>
+        <p:spPr>
+          <a:xfrm>
+            <a:off x="4515815" y="2672944"/>
+            <a:ext cx="1853392" cy="584776"/>
+          </a:xfrm>
+          <a:prstGeom prst="rect">
+            <a:avLst/>
+          </a:prstGeom>
+          <a:noFill/>
+        </p:spPr>
+        <p:txBody>
+          <a:bodyPr wrap="none" rtlCol="0">
+            <a:spAutoFit/>
+          </a:bodyPr>
           <a:lstStyle/>
           <a:p>
             <a:pPr algn="ctr"/>
             <a:r>
-              <a:rPr lang="en-US" sz="2800" dirty="0" err="1" smtClean="0">
-                <a:solidFill>
-                  <a:schemeClr val="tx2"/>
-                </a:solidFill>
-              </a:rPr>
-              <a:t>Productionalized</a:t>
-            </a:r>
-            <a:endParaRPr lang="en-US" sz="2800" dirty="0">
-              <a:solidFill>
-                <a:schemeClr val="tx2"/>
-              </a:solidFill>
-            </a:endParaRPr>
+              <a:rPr lang="en-US" sz="3200" b="1" dirty="0" err="1" smtClean="0"/>
+              <a:t>Omid</a:t>
+            </a:r>
+            <a:r>
+              <a:rPr lang="en-US" sz="3200" b="1" dirty="0" smtClean="0"/>
+              <a:t> 2PC</a:t>
+            </a:r>
+            <a:endParaRPr lang="en-US" sz="3200" b="1" dirty="0"/>
           </a:p>
         </p:txBody>
       </p:sp>
     </p:spTree>
     <p:extLst>
       <p:ext uri="{BB962C8B-B14F-4D97-AF65-F5344CB8AC3E}">
-        <p14:creationId xmlns:p14="http://schemas.microsoft.com/office/powerpoint/2010/main" val="723141169"/>
+        <p14:creationId xmlns:p14="http://schemas.microsoft.com/office/powerpoint/2010/main" val="3547012229"/>
       </p:ext>
     </p:extLst>
   </p:cSld>

</xml_diff>